<commit_message>
Added a second section about writing more tests
</commit_message>
<xml_diff>
--- a/curriculum.pptx
+++ b/curriculum.pptx
@@ -5,7 +5,7 @@
     <p:sldMasterId id="2147483648" r:id="rId1"/>
   </p:sldMasterIdLst>
   <p:notesMasterIdLst>
-    <p:notesMasterId r:id="rId20"/>
+    <p:notesMasterId r:id="rId21"/>
   </p:notesMasterIdLst>
   <p:sldIdLst>
     <p:sldId id="256" r:id="rId2"/>
@@ -22,10 +22,11 @@
     <p:sldId id="269" r:id="rId13"/>
     <p:sldId id="270" r:id="rId14"/>
     <p:sldId id="276" r:id="rId15"/>
-    <p:sldId id="271" r:id="rId16"/>
-    <p:sldId id="272" r:id="rId17"/>
-    <p:sldId id="273" r:id="rId18"/>
-    <p:sldId id="274" r:id="rId19"/>
+    <p:sldId id="277" r:id="rId16"/>
+    <p:sldId id="271" r:id="rId17"/>
+    <p:sldId id="272" r:id="rId18"/>
+    <p:sldId id="273" r:id="rId19"/>
+    <p:sldId id="274" r:id="rId20"/>
   </p:sldIdLst>
   <p:sldSz cx="12192000" cy="6858000"/>
   <p:notesSz cx="6858000" cy="9144000"/>
@@ -4742,12 +4743,22 @@
           <a:p>
             <a:r>
               <a:rPr lang="en-US" dirty="0" smtClean="0"/>
-              <a:t>Follow up with a </a:t>
-            </a:r>
-            <a:r>
-              <a:rPr lang="en-US" smtClean="0"/>
-              <a:t>general implementation</a:t>
-            </a:r>
+              <a:t>Follow up with a general implementation</a:t>
+            </a:r>
+          </a:p>
+          <a:p>
+            <a:r>
+              <a:rPr lang="en-US" dirty="0" smtClean="0"/>
+              <a:t>Pushes previous implementation toward production quality code</a:t>
+            </a:r>
+          </a:p>
+          <a:p>
+            <a:r>
+              <a:rPr lang="en-US" dirty="0" smtClean="0"/>
+              <a:t>Potentially monotonous, useful for ambiguous implementations</a:t>
+            </a:r>
+          </a:p>
+          <a:p>
             <a:endParaRPr lang="en-US" dirty="0" smtClean="0"/>
           </a:p>
         </p:txBody>
@@ -5186,7 +5197,7 @@
           <a:p>
             <a:r>
               <a:rPr lang="en-US" dirty="0" smtClean="0"/>
-              <a:t>Red</a:t>
+              <a:t>Add a test</a:t>
             </a:r>
             <a:endParaRPr lang="en-US" dirty="0"/>
           </a:p>
@@ -5204,84 +5215,34 @@
         </p:nvSpPr>
         <p:spPr/>
         <p:txBody>
-          <a:bodyPr/>
-          <a:lstStyle/>
-          <a:p>
-            <a:endParaRPr lang="en-US" dirty="0" smtClean="0"/>
-          </a:p>
-          <a:p>
-            <a:endParaRPr lang="en-US" dirty="0"/>
-          </a:p>
-          <a:p>
-            <a:endParaRPr lang="en-US" dirty="0" smtClean="0"/>
-          </a:p>
-          <a:p>
-            <a:r>
-              <a:rPr lang="en-US" dirty="0" smtClean="0"/>
-              <a:t>Run the test, ensure it fails</a:t>
-            </a:r>
-          </a:p>
-          <a:p>
-            <a:r>
-              <a:rPr lang="en-US" dirty="0" smtClean="0"/>
-              <a:t>At this stage a failing test is good</a:t>
-            </a:r>
-          </a:p>
-          <a:p>
-            <a:r>
-              <a:rPr lang="en-US" dirty="0" smtClean="0"/>
-              <a:t>Ensures there exists a test that can be made to pass</a:t>
-            </a:r>
-            <a:endParaRPr lang="en-US" dirty="0" smtClean="0"/>
-          </a:p>
-        </p:txBody>
-      </p:sp>
-      <p:sp>
-        <p:nvSpPr>
-          <p:cNvPr id="35" name="TextBox 34"/>
+          <a:bodyPr>
+            <a:normAutofit/>
+          </a:bodyPr>
+          <a:lstStyle/>
+          <a:p>
+            <a:r>
+              <a:rPr lang="en-US" dirty="0" smtClean="0"/>
+              <a:t>Add another small test</a:t>
+            </a:r>
+          </a:p>
+          <a:p>
+            <a:r>
+              <a:rPr lang="en-US" dirty="0" smtClean="0"/>
+              <a:t>Make the new test runnable</a:t>
+            </a:r>
+          </a:p>
+        </p:txBody>
+      </p:sp>
+      <p:sp>
+        <p:nvSpPr>
+          <p:cNvPr id="28" name="TextBox 27"/>
           <p:cNvSpPr txBox="1"/>
           <p:nvPr/>
         </p:nvSpPr>
         <p:spPr>
           <a:xfrm>
-            <a:off x="10717782" y="91414"/>
+            <a:off x="10717781" y="91414"/>
             <a:ext cx="1131977" cy="369332"/>
-          </a:xfrm>
-          <a:prstGeom prst="rect">
-            <a:avLst/>
-          </a:prstGeom>
-          <a:noFill/>
-          <a:ln>
-            <a:solidFill>
-              <a:schemeClr val="accent1"/>
-            </a:solidFill>
-          </a:ln>
-        </p:spPr>
-        <p:txBody>
-          <a:bodyPr wrap="none" rtlCol="0">
-            <a:spAutoFit/>
-          </a:bodyPr>
-          <a:lstStyle/>
-          <a:p>
-            <a:pPr algn="ctr"/>
-            <a:r>
-              <a:rPr lang="en-US" dirty="0" smtClean="0"/>
-              <a:t>Add a test</a:t>
-            </a:r>
-            <a:endParaRPr lang="en-US" dirty="0" smtClean="0"/>
-          </a:p>
-        </p:txBody>
-      </p:sp>
-      <p:sp>
-        <p:nvSpPr>
-          <p:cNvPr id="36" name="TextBox 35"/>
-          <p:cNvSpPr txBox="1"/>
-          <p:nvPr/>
-        </p:nvSpPr>
-        <p:spPr>
-          <a:xfrm>
-            <a:off x="11012250" y="799272"/>
-            <a:ext cx="543034" cy="369332"/>
           </a:xfrm>
           <a:prstGeom prst="rect">
             <a:avLst/>
@@ -5307,22 +5268,22 @@
             <a:pPr algn="ctr"/>
             <a:r>
               <a:rPr lang="en-US" dirty="0" smtClean="0"/>
-              <a:t>Red</a:t>
-            </a:r>
-            <a:endParaRPr lang="en-US" dirty="0"/>
-          </a:p>
-        </p:txBody>
-      </p:sp>
-      <p:sp>
-        <p:nvSpPr>
-          <p:cNvPr id="37" name="TextBox 36"/>
+              <a:t>Add a test</a:t>
+            </a:r>
+            <a:endParaRPr lang="en-US" dirty="0" smtClean="0"/>
+          </a:p>
+        </p:txBody>
+      </p:sp>
+      <p:sp>
+        <p:nvSpPr>
+          <p:cNvPr id="29" name="TextBox 28"/>
           <p:cNvSpPr txBox="1"/>
           <p:nvPr/>
         </p:nvSpPr>
         <p:spPr>
           <a:xfrm>
-            <a:off x="10903600" y="1500699"/>
-            <a:ext cx="760337" cy="369332"/>
+            <a:off x="11012249" y="799272"/>
+            <a:ext cx="543034" cy="369332"/>
           </a:xfrm>
           <a:prstGeom prst="rect">
             <a:avLst/>
@@ -5343,22 +5304,22 @@
             <a:pPr algn="ctr"/>
             <a:r>
               <a:rPr lang="en-US" dirty="0" smtClean="0"/>
-              <a:t>Green</a:t>
-            </a:r>
-            <a:endParaRPr lang="en-US" dirty="0" smtClean="0"/>
-          </a:p>
-        </p:txBody>
-      </p:sp>
-      <p:sp>
-        <p:nvSpPr>
-          <p:cNvPr id="38" name="TextBox 37"/>
+              <a:t>Red</a:t>
+            </a:r>
+            <a:endParaRPr lang="en-US" dirty="0"/>
+          </a:p>
+        </p:txBody>
+      </p:sp>
+      <p:sp>
+        <p:nvSpPr>
+          <p:cNvPr id="30" name="TextBox 29"/>
           <p:cNvSpPr txBox="1"/>
           <p:nvPr/>
         </p:nvSpPr>
         <p:spPr>
           <a:xfrm>
-            <a:off x="10819543" y="2224061"/>
-            <a:ext cx="928460" cy="369332"/>
+            <a:off x="10903599" y="1500699"/>
+            <a:ext cx="760337" cy="369332"/>
           </a:xfrm>
           <a:prstGeom prst="rect">
             <a:avLst/>
@@ -5379,6 +5340,42 @@
             <a:pPr algn="ctr"/>
             <a:r>
               <a:rPr lang="en-US" dirty="0" smtClean="0"/>
+              <a:t>Green</a:t>
+            </a:r>
+            <a:endParaRPr lang="en-US" dirty="0" smtClean="0"/>
+          </a:p>
+        </p:txBody>
+      </p:sp>
+      <p:sp>
+        <p:nvSpPr>
+          <p:cNvPr id="31" name="TextBox 30"/>
+          <p:cNvSpPr txBox="1"/>
+          <p:nvPr/>
+        </p:nvSpPr>
+        <p:spPr>
+          <a:xfrm>
+            <a:off x="10819542" y="2224061"/>
+            <a:ext cx="928460" cy="369332"/>
+          </a:xfrm>
+          <a:prstGeom prst="rect">
+            <a:avLst/>
+          </a:prstGeom>
+          <a:noFill/>
+          <a:ln>
+            <a:solidFill>
+              <a:schemeClr val="accent1"/>
+            </a:solidFill>
+          </a:ln>
+        </p:spPr>
+        <p:txBody>
+          <a:bodyPr wrap="none" rtlCol="0">
+            <a:spAutoFit/>
+          </a:bodyPr>
+          <a:lstStyle/>
+          <a:p>
+            <a:pPr algn="ctr"/>
+            <a:r>
+              <a:rPr lang="en-US" dirty="0" smtClean="0"/>
               <a:t>Commit</a:t>
             </a:r>
             <a:endParaRPr lang="en-US" dirty="0"/>
@@ -5387,13 +5384,13 @@
       </p:sp>
       <p:cxnSp>
         <p:nvCxnSpPr>
-          <p:cNvPr id="39" name="Straight Arrow Connector 38"/>
+          <p:cNvPr id="32" name="Straight Arrow Connector 31"/>
           <p:cNvCxnSpPr/>
           <p:nvPr/>
         </p:nvCxnSpPr>
         <p:spPr>
           <a:xfrm flipH="1">
-            <a:off x="11283767" y="460746"/>
+            <a:off x="11283766" y="460746"/>
             <a:ext cx="4" cy="338526"/>
           </a:xfrm>
           <a:prstGeom prst="straightConnector1">
@@ -5420,13 +5417,13 @@
       </p:cxnSp>
       <p:cxnSp>
         <p:nvCxnSpPr>
-          <p:cNvPr id="40" name="Straight Arrow Connector 39"/>
+          <p:cNvPr id="33" name="Straight Arrow Connector 32"/>
           <p:cNvCxnSpPr/>
           <p:nvPr/>
         </p:nvCxnSpPr>
         <p:spPr>
           <a:xfrm flipH="1">
-            <a:off x="11283761" y="1165539"/>
+            <a:off x="11283760" y="1165539"/>
             <a:ext cx="4" cy="338526"/>
           </a:xfrm>
           <a:prstGeom prst="straightConnector1">
@@ -5453,13 +5450,13 @@
       </p:cxnSp>
       <p:cxnSp>
         <p:nvCxnSpPr>
-          <p:cNvPr id="41" name="Straight Arrow Connector 40"/>
+          <p:cNvPr id="34" name="Straight Arrow Connector 33"/>
           <p:cNvCxnSpPr/>
           <p:nvPr/>
         </p:nvCxnSpPr>
         <p:spPr>
           <a:xfrm flipH="1">
-            <a:off x="11283757" y="1876673"/>
+            <a:off x="11283756" y="1876673"/>
             <a:ext cx="4" cy="338526"/>
           </a:xfrm>
           <a:prstGeom prst="straightConnector1">
@@ -5486,13 +5483,13 @@
       </p:cxnSp>
       <p:cxnSp>
         <p:nvCxnSpPr>
-          <p:cNvPr id="42" name="Straight Arrow Connector 41"/>
+          <p:cNvPr id="35" name="Straight Arrow Connector 34"/>
           <p:cNvCxnSpPr/>
           <p:nvPr/>
         </p:nvCxnSpPr>
         <p:spPr>
           <a:xfrm flipH="1">
-            <a:off x="11295481" y="2591777"/>
+            <a:off x="11295480" y="2591777"/>
             <a:ext cx="4" cy="338526"/>
           </a:xfrm>
           <a:prstGeom prst="straightConnector1">
@@ -5519,13 +5516,13 @@
       </p:cxnSp>
       <p:sp>
         <p:nvSpPr>
-          <p:cNvPr id="43" name="TextBox 42"/>
+          <p:cNvPr id="36" name="TextBox 35"/>
           <p:cNvSpPr txBox="1"/>
           <p:nvPr/>
         </p:nvSpPr>
         <p:spPr>
           <a:xfrm>
-            <a:off x="10821813" y="2920630"/>
+            <a:off x="10821812" y="2920630"/>
             <a:ext cx="970780" cy="369332"/>
           </a:xfrm>
           <a:prstGeom prst="rect">
@@ -5555,13 +5552,13 @@
       </p:sp>
       <p:cxnSp>
         <p:nvCxnSpPr>
-          <p:cNvPr id="44" name="Elbow Connector 43"/>
+          <p:cNvPr id="37" name="Elbow Connector 36"/>
           <p:cNvCxnSpPr/>
           <p:nvPr/>
         </p:nvCxnSpPr>
         <p:spPr>
           <a:xfrm flipV="1">
-            <a:off x="11792593" y="276080"/>
+            <a:off x="11792592" y="276080"/>
             <a:ext cx="57166" cy="2829216"/>
           </a:xfrm>
           <a:prstGeom prst="bentConnector3">
@@ -5590,13 +5587,13 @@
       </p:cxnSp>
       <p:cxnSp>
         <p:nvCxnSpPr>
-          <p:cNvPr id="45" name="Elbow Connector 44"/>
+          <p:cNvPr id="38" name="Elbow Connector 37"/>
           <p:cNvCxnSpPr/>
           <p:nvPr/>
         </p:nvCxnSpPr>
         <p:spPr>
           <a:xfrm rot="10800000" flipH="1">
-            <a:off x="10821812" y="1685366"/>
+            <a:off x="10821811" y="1685366"/>
             <a:ext cx="81787" cy="1419931"/>
           </a:xfrm>
           <a:prstGeom prst="bentConnector3">
@@ -5626,7 +5623,7 @@
     </p:spTree>
     <p:extLst>
       <p:ext uri="{BB962C8B-B14F-4D97-AF65-F5344CB8AC3E}">
-        <p14:creationId xmlns:p14="http://schemas.microsoft.com/office/powerpoint/2010/main" val="176814325"/>
+        <p14:creationId xmlns:p14="http://schemas.microsoft.com/office/powerpoint/2010/main" val="327678577"/>
       </p:ext>
     </p:extLst>
   </p:cSld>
@@ -5670,7 +5667,7 @@
           <a:p>
             <a:r>
               <a:rPr lang="en-US" dirty="0" smtClean="0"/>
-              <a:t>Green</a:t>
+              <a:t>Red</a:t>
             </a:r>
             <a:endParaRPr lang="en-US" dirty="0"/>
           </a:p>
@@ -5688,43 +5685,44 @@
         </p:nvSpPr>
         <p:spPr/>
         <p:txBody>
-          <a:bodyPr>
-            <a:normAutofit/>
-          </a:bodyPr>
-          <a:lstStyle/>
-          <a:p>
+          <a:bodyPr/>
+          <a:lstStyle/>
+          <a:p>
+            <a:r>
+              <a:rPr lang="en-US" dirty="0" smtClean="0"/>
+              <a:t>Run the test, ensuring it fails</a:t>
+            </a:r>
+          </a:p>
+          <a:p>
+            <a:r>
+              <a:rPr lang="en-US" dirty="0" smtClean="0"/>
+              <a:t>If it doesn’t fail, change it so it does</a:t>
+            </a:r>
+          </a:p>
+          <a:p>
+            <a:r>
+              <a:rPr lang="en-US" dirty="0" smtClean="0"/>
+              <a:t>If you’re still unable to: identify what you’re trying to test</a:t>
+            </a:r>
+          </a:p>
+          <a:p>
+            <a:r>
+              <a:rPr lang="en-US" dirty="0" smtClean="0"/>
+              <a:t>Devise a new test that does fail</a:t>
+            </a:r>
+          </a:p>
+          <a:p>
+            <a:r>
+              <a:rPr lang="en-US" dirty="0" smtClean="0"/>
+              <a:t>New tests are to result in a small increment of new functionality</a:t>
+            </a:r>
             <a:endParaRPr lang="en-US" dirty="0" smtClean="0"/>
           </a:p>
-          <a:p>
-            <a:endParaRPr lang="en-US" dirty="0"/>
-          </a:p>
-          <a:p>
-            <a:endParaRPr lang="en-US" dirty="0" smtClean="0"/>
-          </a:p>
-          <a:p>
-            <a:r>
-              <a:rPr lang="en-US" dirty="0" smtClean="0"/>
-              <a:t>Make the test pass by adding the least amount of code possible</a:t>
-            </a:r>
-          </a:p>
-          <a:p>
-            <a:r>
-              <a:rPr lang="en-US" dirty="0" smtClean="0"/>
-              <a:t>If possible, consider a hard coded value</a:t>
-            </a:r>
-            <a:endParaRPr lang="en-US" dirty="0"/>
-          </a:p>
-          <a:p>
-            <a:r>
-              <a:rPr lang="en-US" dirty="0" smtClean="0"/>
-              <a:t>Don’t worry about the future too much</a:t>
-            </a:r>
-          </a:p>
-        </p:txBody>
-      </p:sp>
-      <p:sp>
-        <p:nvSpPr>
-          <p:cNvPr id="4" name="TextBox 3"/>
+        </p:txBody>
+      </p:sp>
+      <p:sp>
+        <p:nvSpPr>
+          <p:cNvPr id="35" name="TextBox 34"/>
           <p:cNvSpPr txBox="1"/>
           <p:nvPr/>
         </p:nvSpPr>
@@ -5760,7 +5758,7 @@
       </p:sp>
       <p:sp>
         <p:nvSpPr>
-          <p:cNvPr id="5" name="TextBox 4"/>
+          <p:cNvPr id="36" name="TextBox 35"/>
           <p:cNvSpPr txBox="1"/>
           <p:nvPr/>
         </p:nvSpPr>
@@ -5768,42 +5766,6 @@
           <a:xfrm>
             <a:off x="11012250" y="799272"/>
             <a:ext cx="543034" cy="369332"/>
-          </a:xfrm>
-          <a:prstGeom prst="rect">
-            <a:avLst/>
-          </a:prstGeom>
-          <a:noFill/>
-          <a:ln>
-            <a:solidFill>
-              <a:schemeClr val="accent1"/>
-            </a:solidFill>
-          </a:ln>
-        </p:spPr>
-        <p:txBody>
-          <a:bodyPr wrap="none" rtlCol="0">
-            <a:spAutoFit/>
-          </a:bodyPr>
-          <a:lstStyle/>
-          <a:p>
-            <a:pPr algn="ctr"/>
-            <a:r>
-              <a:rPr lang="en-US" dirty="0" smtClean="0"/>
-              <a:t>Red</a:t>
-            </a:r>
-            <a:endParaRPr lang="en-US" dirty="0"/>
-          </a:p>
-        </p:txBody>
-      </p:sp>
-      <p:sp>
-        <p:nvSpPr>
-          <p:cNvPr id="6" name="TextBox 5"/>
-          <p:cNvSpPr txBox="1"/>
-          <p:nvPr/>
-        </p:nvSpPr>
-        <p:spPr>
-          <a:xfrm>
-            <a:off x="10903600" y="1500699"/>
-            <a:ext cx="760337" cy="369332"/>
           </a:xfrm>
           <a:prstGeom prst="rect">
             <a:avLst/>
@@ -5829,6 +5791,42 @@
             <a:pPr algn="ctr"/>
             <a:r>
               <a:rPr lang="en-US" dirty="0" smtClean="0"/>
+              <a:t>Red</a:t>
+            </a:r>
+            <a:endParaRPr lang="en-US" dirty="0"/>
+          </a:p>
+        </p:txBody>
+      </p:sp>
+      <p:sp>
+        <p:nvSpPr>
+          <p:cNvPr id="37" name="TextBox 36"/>
+          <p:cNvSpPr txBox="1"/>
+          <p:nvPr/>
+        </p:nvSpPr>
+        <p:spPr>
+          <a:xfrm>
+            <a:off x="10903600" y="1500699"/>
+            <a:ext cx="760337" cy="369332"/>
+          </a:xfrm>
+          <a:prstGeom prst="rect">
+            <a:avLst/>
+          </a:prstGeom>
+          <a:noFill/>
+          <a:ln>
+            <a:solidFill>
+              <a:schemeClr val="accent1"/>
+            </a:solidFill>
+          </a:ln>
+        </p:spPr>
+        <p:txBody>
+          <a:bodyPr wrap="none" rtlCol="0">
+            <a:spAutoFit/>
+          </a:bodyPr>
+          <a:lstStyle/>
+          <a:p>
+            <a:pPr algn="ctr"/>
+            <a:r>
+              <a:rPr lang="en-US" dirty="0" smtClean="0"/>
               <a:t>Green</a:t>
             </a:r>
             <a:endParaRPr lang="en-US" dirty="0" smtClean="0"/>
@@ -5837,7 +5835,7 @@
       </p:sp>
       <p:sp>
         <p:nvSpPr>
-          <p:cNvPr id="7" name="TextBox 6"/>
+          <p:cNvPr id="38" name="TextBox 37"/>
           <p:cNvSpPr txBox="1"/>
           <p:nvPr/>
         </p:nvSpPr>
@@ -5873,7 +5871,7 @@
       </p:sp>
       <p:cxnSp>
         <p:nvCxnSpPr>
-          <p:cNvPr id="8" name="Straight Arrow Connector 7"/>
+          <p:cNvPr id="39" name="Straight Arrow Connector 38"/>
           <p:cNvCxnSpPr/>
           <p:nvPr/>
         </p:nvCxnSpPr>
@@ -5906,7 +5904,7 @@
       </p:cxnSp>
       <p:cxnSp>
         <p:nvCxnSpPr>
-          <p:cNvPr id="9" name="Straight Arrow Connector 8"/>
+          <p:cNvPr id="40" name="Straight Arrow Connector 39"/>
           <p:cNvCxnSpPr/>
           <p:nvPr/>
         </p:nvCxnSpPr>
@@ -5939,7 +5937,7 @@
       </p:cxnSp>
       <p:cxnSp>
         <p:nvCxnSpPr>
-          <p:cNvPr id="10" name="Straight Arrow Connector 9"/>
+          <p:cNvPr id="41" name="Straight Arrow Connector 40"/>
           <p:cNvCxnSpPr/>
           <p:nvPr/>
         </p:nvCxnSpPr>
@@ -5972,7 +5970,7 @@
       </p:cxnSp>
       <p:cxnSp>
         <p:nvCxnSpPr>
-          <p:cNvPr id="11" name="Straight Arrow Connector 10"/>
+          <p:cNvPr id="42" name="Straight Arrow Connector 41"/>
           <p:cNvCxnSpPr/>
           <p:nvPr/>
         </p:nvCxnSpPr>
@@ -6005,7 +6003,7 @@
       </p:cxnSp>
       <p:sp>
         <p:nvSpPr>
-          <p:cNvPr id="12" name="TextBox 11"/>
+          <p:cNvPr id="43" name="TextBox 42"/>
           <p:cNvSpPr txBox="1"/>
           <p:nvPr/>
         </p:nvSpPr>
@@ -6041,7 +6039,7 @@
       </p:sp>
       <p:cxnSp>
         <p:nvCxnSpPr>
-          <p:cNvPr id="13" name="Elbow Connector 12"/>
+          <p:cNvPr id="44" name="Elbow Connector 43"/>
           <p:cNvCxnSpPr/>
           <p:nvPr/>
         </p:nvCxnSpPr>
@@ -6076,7 +6074,7 @@
       </p:cxnSp>
       <p:cxnSp>
         <p:nvCxnSpPr>
-          <p:cNvPr id="14" name="Elbow Connector 13"/>
+          <p:cNvPr id="45" name="Elbow Connector 44"/>
           <p:cNvCxnSpPr/>
           <p:nvPr/>
         </p:nvCxnSpPr>
@@ -6112,7 +6110,7 @@
     </p:spTree>
     <p:extLst>
       <p:ext uri="{BB962C8B-B14F-4D97-AF65-F5344CB8AC3E}">
-        <p14:creationId xmlns:p14="http://schemas.microsoft.com/office/powerpoint/2010/main" val="1748476474"/>
+        <p14:creationId xmlns:p14="http://schemas.microsoft.com/office/powerpoint/2010/main" val="176814325"/>
       </p:ext>
     </p:extLst>
   </p:cSld>
@@ -6156,6 +6154,481 @@
           <a:p>
             <a:r>
               <a:rPr lang="en-US" dirty="0" smtClean="0"/>
+              <a:t>Green</a:t>
+            </a:r>
+            <a:endParaRPr lang="en-US" dirty="0"/>
+          </a:p>
+        </p:txBody>
+      </p:sp>
+      <p:sp>
+        <p:nvSpPr>
+          <p:cNvPr id="3" name="Content Placeholder 2"/>
+          <p:cNvSpPr>
+            <a:spLocks noGrp="1"/>
+          </p:cNvSpPr>
+          <p:nvPr>
+            <p:ph idx="1"/>
+          </p:nvPr>
+        </p:nvSpPr>
+        <p:spPr/>
+        <p:txBody>
+          <a:bodyPr>
+            <a:normAutofit/>
+          </a:bodyPr>
+          <a:lstStyle/>
+          <a:p>
+            <a:r>
+              <a:rPr lang="en-US" dirty="0" smtClean="0"/>
+              <a:t>Make the test pass with the least amount of code</a:t>
+            </a:r>
+          </a:p>
+          <a:p>
+            <a:r>
+              <a:rPr lang="en-US" dirty="0" smtClean="0"/>
+              <a:t>If triangulating</a:t>
+            </a:r>
+            <a:r>
+              <a:rPr lang="en-US" smtClean="0"/>
+              <a:t>, you’ll likely remove previous hard coding</a:t>
+            </a:r>
+            <a:endParaRPr lang="en-US" dirty="0" smtClean="0"/>
+          </a:p>
+        </p:txBody>
+      </p:sp>
+      <p:sp>
+        <p:nvSpPr>
+          <p:cNvPr id="4" name="TextBox 3"/>
+          <p:cNvSpPr txBox="1"/>
+          <p:nvPr/>
+        </p:nvSpPr>
+        <p:spPr>
+          <a:xfrm>
+            <a:off x="10717782" y="91414"/>
+            <a:ext cx="1131977" cy="369332"/>
+          </a:xfrm>
+          <a:prstGeom prst="rect">
+            <a:avLst/>
+          </a:prstGeom>
+          <a:noFill/>
+          <a:ln>
+            <a:solidFill>
+              <a:schemeClr val="accent1"/>
+            </a:solidFill>
+          </a:ln>
+        </p:spPr>
+        <p:txBody>
+          <a:bodyPr wrap="none" rtlCol="0">
+            <a:spAutoFit/>
+          </a:bodyPr>
+          <a:lstStyle/>
+          <a:p>
+            <a:pPr algn="ctr"/>
+            <a:r>
+              <a:rPr lang="en-US" dirty="0" smtClean="0"/>
+              <a:t>Add a test</a:t>
+            </a:r>
+            <a:endParaRPr lang="en-US" dirty="0" smtClean="0"/>
+          </a:p>
+        </p:txBody>
+      </p:sp>
+      <p:sp>
+        <p:nvSpPr>
+          <p:cNvPr id="5" name="TextBox 4"/>
+          <p:cNvSpPr txBox="1"/>
+          <p:nvPr/>
+        </p:nvSpPr>
+        <p:spPr>
+          <a:xfrm>
+            <a:off x="11012250" y="799272"/>
+            <a:ext cx="543034" cy="369332"/>
+          </a:xfrm>
+          <a:prstGeom prst="rect">
+            <a:avLst/>
+          </a:prstGeom>
+          <a:noFill/>
+          <a:ln>
+            <a:solidFill>
+              <a:schemeClr val="accent1"/>
+            </a:solidFill>
+          </a:ln>
+        </p:spPr>
+        <p:txBody>
+          <a:bodyPr wrap="none" rtlCol="0">
+            <a:spAutoFit/>
+          </a:bodyPr>
+          <a:lstStyle/>
+          <a:p>
+            <a:pPr algn="ctr"/>
+            <a:r>
+              <a:rPr lang="en-US" dirty="0" smtClean="0"/>
+              <a:t>Red</a:t>
+            </a:r>
+            <a:endParaRPr lang="en-US" dirty="0"/>
+          </a:p>
+        </p:txBody>
+      </p:sp>
+      <p:sp>
+        <p:nvSpPr>
+          <p:cNvPr id="6" name="TextBox 5"/>
+          <p:cNvSpPr txBox="1"/>
+          <p:nvPr/>
+        </p:nvSpPr>
+        <p:spPr>
+          <a:xfrm>
+            <a:off x="10903600" y="1500699"/>
+            <a:ext cx="760337" cy="369332"/>
+          </a:xfrm>
+          <a:prstGeom prst="rect">
+            <a:avLst/>
+          </a:prstGeom>
+          <a:solidFill>
+            <a:schemeClr val="accent4">
+              <a:lumMod val="20000"/>
+              <a:lumOff val="80000"/>
+            </a:schemeClr>
+          </a:solidFill>
+          <a:ln>
+            <a:solidFill>
+              <a:schemeClr val="accent1"/>
+            </a:solidFill>
+          </a:ln>
+        </p:spPr>
+        <p:txBody>
+          <a:bodyPr wrap="none" rtlCol="0">
+            <a:spAutoFit/>
+          </a:bodyPr>
+          <a:lstStyle/>
+          <a:p>
+            <a:pPr algn="ctr"/>
+            <a:r>
+              <a:rPr lang="en-US" dirty="0" smtClean="0"/>
+              <a:t>Green</a:t>
+            </a:r>
+            <a:endParaRPr lang="en-US" dirty="0" smtClean="0"/>
+          </a:p>
+        </p:txBody>
+      </p:sp>
+      <p:sp>
+        <p:nvSpPr>
+          <p:cNvPr id="7" name="TextBox 6"/>
+          <p:cNvSpPr txBox="1"/>
+          <p:nvPr/>
+        </p:nvSpPr>
+        <p:spPr>
+          <a:xfrm>
+            <a:off x="10819543" y="2224061"/>
+            <a:ext cx="928460" cy="369332"/>
+          </a:xfrm>
+          <a:prstGeom prst="rect">
+            <a:avLst/>
+          </a:prstGeom>
+          <a:noFill/>
+          <a:ln>
+            <a:solidFill>
+              <a:schemeClr val="accent1"/>
+            </a:solidFill>
+          </a:ln>
+        </p:spPr>
+        <p:txBody>
+          <a:bodyPr wrap="none" rtlCol="0">
+            <a:spAutoFit/>
+          </a:bodyPr>
+          <a:lstStyle/>
+          <a:p>
+            <a:pPr algn="ctr"/>
+            <a:r>
+              <a:rPr lang="en-US" dirty="0" smtClean="0"/>
+              <a:t>Commit</a:t>
+            </a:r>
+            <a:endParaRPr lang="en-US" dirty="0"/>
+          </a:p>
+        </p:txBody>
+      </p:sp>
+      <p:cxnSp>
+        <p:nvCxnSpPr>
+          <p:cNvPr id="8" name="Straight Arrow Connector 7"/>
+          <p:cNvCxnSpPr/>
+          <p:nvPr/>
+        </p:nvCxnSpPr>
+        <p:spPr>
+          <a:xfrm flipH="1">
+            <a:off x="11283767" y="460746"/>
+            <a:ext cx="4" cy="338526"/>
+          </a:xfrm>
+          <a:prstGeom prst="straightConnector1">
+            <a:avLst/>
+          </a:prstGeom>
+          <a:ln>
+            <a:tailEnd type="triangle"/>
+          </a:ln>
+        </p:spPr>
+        <p:style>
+          <a:lnRef idx="1">
+            <a:schemeClr val="accent1"/>
+          </a:lnRef>
+          <a:fillRef idx="0">
+            <a:schemeClr val="accent1"/>
+          </a:fillRef>
+          <a:effectRef idx="0">
+            <a:schemeClr val="accent1"/>
+          </a:effectRef>
+          <a:fontRef idx="minor">
+            <a:schemeClr val="tx1"/>
+          </a:fontRef>
+        </p:style>
+      </p:cxnSp>
+      <p:cxnSp>
+        <p:nvCxnSpPr>
+          <p:cNvPr id="9" name="Straight Arrow Connector 8"/>
+          <p:cNvCxnSpPr/>
+          <p:nvPr/>
+        </p:nvCxnSpPr>
+        <p:spPr>
+          <a:xfrm flipH="1">
+            <a:off x="11283761" y="1165539"/>
+            <a:ext cx="4" cy="338526"/>
+          </a:xfrm>
+          <a:prstGeom prst="straightConnector1">
+            <a:avLst/>
+          </a:prstGeom>
+          <a:ln>
+            <a:tailEnd type="triangle"/>
+          </a:ln>
+        </p:spPr>
+        <p:style>
+          <a:lnRef idx="1">
+            <a:schemeClr val="accent1"/>
+          </a:lnRef>
+          <a:fillRef idx="0">
+            <a:schemeClr val="accent1"/>
+          </a:fillRef>
+          <a:effectRef idx="0">
+            <a:schemeClr val="accent1"/>
+          </a:effectRef>
+          <a:fontRef idx="minor">
+            <a:schemeClr val="tx1"/>
+          </a:fontRef>
+        </p:style>
+      </p:cxnSp>
+      <p:cxnSp>
+        <p:nvCxnSpPr>
+          <p:cNvPr id="10" name="Straight Arrow Connector 9"/>
+          <p:cNvCxnSpPr/>
+          <p:nvPr/>
+        </p:nvCxnSpPr>
+        <p:spPr>
+          <a:xfrm flipH="1">
+            <a:off x="11283757" y="1876673"/>
+            <a:ext cx="4" cy="338526"/>
+          </a:xfrm>
+          <a:prstGeom prst="straightConnector1">
+            <a:avLst/>
+          </a:prstGeom>
+          <a:ln>
+            <a:tailEnd type="triangle"/>
+          </a:ln>
+        </p:spPr>
+        <p:style>
+          <a:lnRef idx="1">
+            <a:schemeClr val="accent1"/>
+          </a:lnRef>
+          <a:fillRef idx="0">
+            <a:schemeClr val="accent1"/>
+          </a:fillRef>
+          <a:effectRef idx="0">
+            <a:schemeClr val="accent1"/>
+          </a:effectRef>
+          <a:fontRef idx="minor">
+            <a:schemeClr val="tx1"/>
+          </a:fontRef>
+        </p:style>
+      </p:cxnSp>
+      <p:cxnSp>
+        <p:nvCxnSpPr>
+          <p:cNvPr id="11" name="Straight Arrow Connector 10"/>
+          <p:cNvCxnSpPr/>
+          <p:nvPr/>
+        </p:nvCxnSpPr>
+        <p:spPr>
+          <a:xfrm flipH="1">
+            <a:off x="11295481" y="2591777"/>
+            <a:ext cx="4" cy="338526"/>
+          </a:xfrm>
+          <a:prstGeom prst="straightConnector1">
+            <a:avLst/>
+          </a:prstGeom>
+          <a:ln>
+            <a:tailEnd type="triangle"/>
+          </a:ln>
+        </p:spPr>
+        <p:style>
+          <a:lnRef idx="1">
+            <a:schemeClr val="accent1"/>
+          </a:lnRef>
+          <a:fillRef idx="0">
+            <a:schemeClr val="accent1"/>
+          </a:fillRef>
+          <a:effectRef idx="0">
+            <a:schemeClr val="accent1"/>
+          </a:effectRef>
+          <a:fontRef idx="minor">
+            <a:schemeClr val="tx1"/>
+          </a:fontRef>
+        </p:style>
+      </p:cxnSp>
+      <p:sp>
+        <p:nvSpPr>
+          <p:cNvPr id="12" name="TextBox 11"/>
+          <p:cNvSpPr txBox="1"/>
+          <p:nvPr/>
+        </p:nvSpPr>
+        <p:spPr>
+          <a:xfrm>
+            <a:off x="10821813" y="2920630"/>
+            <a:ext cx="970780" cy="369332"/>
+          </a:xfrm>
+          <a:prstGeom prst="rect">
+            <a:avLst/>
+          </a:prstGeom>
+          <a:noFill/>
+          <a:ln>
+            <a:solidFill>
+              <a:schemeClr val="accent1"/>
+            </a:solidFill>
+          </a:ln>
+        </p:spPr>
+        <p:txBody>
+          <a:bodyPr wrap="none" rtlCol="0">
+            <a:spAutoFit/>
+          </a:bodyPr>
+          <a:lstStyle/>
+          <a:p>
+            <a:pPr algn="ctr"/>
+            <a:r>
+              <a:rPr lang="en-US" smtClean="0"/>
+              <a:t>Refactor</a:t>
+            </a:r>
+            <a:endParaRPr lang="en-US" dirty="0"/>
+          </a:p>
+        </p:txBody>
+      </p:sp>
+      <p:cxnSp>
+        <p:nvCxnSpPr>
+          <p:cNvPr id="13" name="Elbow Connector 12"/>
+          <p:cNvCxnSpPr/>
+          <p:nvPr/>
+        </p:nvCxnSpPr>
+        <p:spPr>
+          <a:xfrm flipV="1">
+            <a:off x="11792593" y="276080"/>
+            <a:ext cx="57166" cy="2829216"/>
+          </a:xfrm>
+          <a:prstGeom prst="bentConnector3">
+            <a:avLst>
+              <a:gd name="adj1" fmla="val 499888"/>
+            </a:avLst>
+          </a:prstGeom>
+          <a:ln>
+            <a:tailEnd type="triangle"/>
+          </a:ln>
+        </p:spPr>
+        <p:style>
+          <a:lnRef idx="1">
+            <a:schemeClr val="accent1"/>
+          </a:lnRef>
+          <a:fillRef idx="0">
+            <a:schemeClr val="accent1"/>
+          </a:fillRef>
+          <a:effectRef idx="0">
+            <a:schemeClr val="accent1"/>
+          </a:effectRef>
+          <a:fontRef idx="minor">
+            <a:schemeClr val="tx1"/>
+          </a:fontRef>
+        </p:style>
+      </p:cxnSp>
+      <p:cxnSp>
+        <p:nvCxnSpPr>
+          <p:cNvPr id="14" name="Elbow Connector 13"/>
+          <p:cNvCxnSpPr/>
+          <p:nvPr/>
+        </p:nvCxnSpPr>
+        <p:spPr>
+          <a:xfrm rot="10800000" flipH="1">
+            <a:off x="10821812" y="1685366"/>
+            <a:ext cx="81787" cy="1419931"/>
+          </a:xfrm>
+          <a:prstGeom prst="bentConnector3">
+            <a:avLst>
+              <a:gd name="adj1" fmla="val -279507"/>
+            </a:avLst>
+          </a:prstGeom>
+          <a:ln>
+            <a:tailEnd type="triangle"/>
+          </a:ln>
+        </p:spPr>
+        <p:style>
+          <a:lnRef idx="1">
+            <a:schemeClr val="accent1"/>
+          </a:lnRef>
+          <a:fillRef idx="0">
+            <a:schemeClr val="accent1"/>
+          </a:fillRef>
+          <a:effectRef idx="0">
+            <a:schemeClr val="accent1"/>
+          </a:effectRef>
+          <a:fontRef idx="minor">
+            <a:schemeClr val="tx1"/>
+          </a:fontRef>
+        </p:style>
+      </p:cxnSp>
+    </p:spTree>
+    <p:extLst>
+      <p:ext uri="{BB962C8B-B14F-4D97-AF65-F5344CB8AC3E}">
+        <p14:creationId xmlns:p14="http://schemas.microsoft.com/office/powerpoint/2010/main" val="1748476474"/>
+      </p:ext>
+    </p:extLst>
+  </p:cSld>
+  <p:clrMapOvr>
+    <a:masterClrMapping/>
+  </p:clrMapOvr>
+</p:sld>
+</file>
+
+<file path=ppt/slides/slide18.xml><?xml version="1.0" encoding="utf-8"?>
+<p:sld xmlns:a="http://schemas.openxmlformats.org/drawingml/2006/main" xmlns:r="http://schemas.openxmlformats.org/officeDocument/2006/relationships" xmlns:p="http://schemas.openxmlformats.org/presentationml/2006/main">
+  <p:cSld>
+    <p:spTree>
+      <p:nvGrpSpPr>
+        <p:cNvPr id="1" name=""/>
+        <p:cNvGrpSpPr/>
+        <p:nvPr/>
+      </p:nvGrpSpPr>
+      <p:grpSpPr>
+        <a:xfrm>
+          <a:off x="0" y="0"/>
+          <a:ext cx="0" cy="0"/>
+          <a:chOff x="0" y="0"/>
+          <a:chExt cx="0" cy="0"/>
+        </a:xfrm>
+      </p:grpSpPr>
+      <p:sp>
+        <p:nvSpPr>
+          <p:cNvPr id="2" name="Title 1"/>
+          <p:cNvSpPr>
+            <a:spLocks noGrp="1"/>
+          </p:cNvSpPr>
+          <p:nvPr>
+            <p:ph type="title"/>
+          </p:nvPr>
+        </p:nvSpPr>
+        <p:spPr/>
+        <p:txBody>
+          <a:bodyPr/>
+          <a:lstStyle/>
+          <a:p>
+            <a:r>
+              <a:rPr lang="en-US" dirty="0" smtClean="0"/>
               <a:t>Commit</a:t>
             </a:r>
             <a:endParaRPr lang="en-US" dirty="0"/>
@@ -6604,7 +7077,7 @@
 </p:sld>
 </file>
 
-<file path=ppt/slides/slide18.xml><?xml version="1.0" encoding="utf-8"?>
+<file path=ppt/slides/slide19.xml><?xml version="1.0" encoding="utf-8"?>
 <p:sld xmlns:a="http://schemas.openxmlformats.org/drawingml/2006/main" xmlns:r="http://schemas.openxmlformats.org/officeDocument/2006/relationships" xmlns:p="http://schemas.openxmlformats.org/presentationml/2006/main">
   <p:cSld>
     <p:spTree>

</xml_diff>